<commit_message>
Sunday Push - Extra work
- Lesson50
-- Refatored ConsoleUI and EmailService classes
-- Changed return type for GetOrderTime and Send methods in Order class and EmailService class
-- Created DB folder where all data is stored
-- Updated ReadOnly Paths fod FoodItem, Order and Table repositories
-- Added additional functionality to IOrderRepository
-- Added additional functionality to OrderRepository
-- Added IRecipientValidator and RecipientValidator interface and class
</commit_message>
<xml_diff>
--- a/Lesson50/Lesson Material/C# Advanced Exam en.pptx
+++ b/Lesson50/Lesson Material/C# Advanced Exam en.pptx
@@ -248,7 +248,7 @@
       <p15:sldGuideLst xmlns:p15="http://schemas.microsoft.com/office/powerpoint/2012/main"/>
     </p:ext>
     <p:ext uri="http://customooxmlschemas.google.com/">
-      <go:slidesCustomData xmlns:go="http://customooxmlschemas.google.com/" xmlns:ahyp="http://schemas.microsoft.com/office/drawing/2018/hyperlinkcolor" xmlns:p15="http://schemas.microsoft.com/office/powerpoint/2012/main" xmlns:p14="http://schemas.microsoft.com/office/powerpoint/2010/main" xmlns:com="http://schemas.openxmlformats.org/drawingml/2006/compatibility" xmlns:pvml="urn:schemas-microsoft-com:office:powerpoint" xmlns:v="urn:schemas-microsoft-com:vml" xmlns:o="urn:schemas-microsoft-com:office:office" xmlns:dgm="http://schemas.openxmlformats.org/drawingml/2006/diagram" xmlns:c="http://schemas.openxmlformats.org/drawingml/2006/chart" xmlns:mv="urn:schemas-microsoft-com:mac:vml" xmlns:mc="http://schemas.openxmlformats.org/markup-compatibility/2006" xmlns="" r:id="rId9" roundtripDataSignature="AMtx7mh1PM4r4xqnro+pCap2HGeE85FKbA=="/>
+      <go:slidesCustomData xmlns="" xmlns:mc="http://schemas.openxmlformats.org/markup-compatibility/2006" xmlns:mv="urn:schemas-microsoft-com:mac:vml" xmlns:c="http://schemas.openxmlformats.org/drawingml/2006/chart" xmlns:dgm="http://schemas.openxmlformats.org/drawingml/2006/diagram" xmlns:o="urn:schemas-microsoft-com:office:office" xmlns:v="urn:schemas-microsoft-com:vml" xmlns:pvml="urn:schemas-microsoft-com:office:powerpoint" xmlns:com="http://schemas.openxmlformats.org/drawingml/2006/compatibility" xmlns:p14="http://schemas.microsoft.com/office/powerpoint/2010/main" xmlns:p15="http://schemas.microsoft.com/office/powerpoint/2012/main" xmlns:ahyp="http://schemas.microsoft.com/office/drawing/2018/hyperlinkcolor" xmlns:go="http://customooxmlschemas.google.com/" r:id="rId9" roundtripDataSignature="AMtx7mh1PM4r4xqnro+pCap2HGeE85FKbA=="/>
     </p:ext>
   </p:extLst>
 </p:presentation>
@@ -908,8 +908,8 @@
         </p:nvSpPr>
         <p:spPr>
           <a:xfrm>
-            <a:off x="1143000" y="685800"/>
-            <a:ext cx="4572000" cy="3429000"/>
+            <a:off x="381000" y="685800"/>
+            <a:ext cx="6096000" cy="3429000"/>
           </a:xfrm>
           <a:custGeom>
             <a:avLst/>
@@ -15184,6 +15184,21 @@
 </file>
 
 <file path=customXml/item1.xml><?xml version="1.0" encoding="utf-8"?>
+<?mso-contentType ?>
+<FormTemplates xmlns="http://schemas.microsoft.com/sharepoint/v3/contenttype/forms">
+  <Display>DocumentLibraryForm</Display>
+  <Edit>DocumentLibraryForm</Edit>
+  <New>DocumentLibraryForm</New>
+</FormTemplates>
+</file>
+
+<file path=customXml/item2.xml><?xml version="1.0" encoding="utf-8"?>
+<p:properties xmlns:p="http://schemas.microsoft.com/office/2006/metadata/properties" xmlns:xsi="http://www.w3.org/2001/XMLSchema-instance" xmlns:pc="http://schemas.microsoft.com/office/infopath/2007/PartnerControls">
+  <documentManagement/>
+</p:properties>
+</file>
+
+<file path=customXml/item3.xml><?xml version="1.0" encoding="utf-8"?>
 <ct:contentTypeSchema xmlns:ct="http://schemas.microsoft.com/office/2006/metadata/contentType" xmlns:ma="http://schemas.microsoft.com/office/2006/metadata/properties/metaAttributes" ct:_="" ma:_="" ma:contentTypeName="Dokumentas" ma:contentTypeID="0x010100A6A4ACF2A8DF004CA94A2D6A4303FCEA" ma:contentTypeVersion="4" ma:contentTypeDescription="Kurkite naują dokumentą." ma:contentTypeScope="" ma:versionID="08d68a36c92ffacd566fdfddc870dc50">
   <xsd:schema xmlns:xsd="http://www.w3.org/2001/XMLSchema" xmlns:xs="http://www.w3.org/2001/XMLSchema" xmlns:p="http://schemas.microsoft.com/office/2006/metadata/properties" xmlns:ns2="a3b97f0a-8a49-47eb-801c-707cd9a5bca1" targetNamespace="http://schemas.microsoft.com/office/2006/metadata/properties" ma:root="true" ma:fieldsID="ebfdd39916c5dd47cd5e2945ece20c3e" ns2:_="">
     <xsd:import namespace="a3b97f0a-8a49-47eb-801c-707cd9a5bca1"/>
@@ -15327,23 +15342,12 @@
 </ct:contentTypeSchema>
 </file>
 
-<file path=customXml/item2.xml><?xml version="1.0" encoding="utf-8"?>
-<p:properties xmlns:p="http://schemas.microsoft.com/office/2006/metadata/properties" xmlns:xsi="http://www.w3.org/2001/XMLSchema-instance" xmlns:pc="http://schemas.microsoft.com/office/infopath/2007/PartnerControls">
-  <documentManagement/>
-</p:properties>
-</file>
-
-<file path=customXml/item3.xml><?xml version="1.0" encoding="utf-8"?>
-<?mso-contentType ?>
-<FormTemplates xmlns="http://schemas.microsoft.com/sharepoint/v3/contenttype/forms">
-  <Display>DocumentLibraryForm</Display>
-  <Edit>DocumentLibraryForm</Edit>
-  <New>DocumentLibraryForm</New>
-</FormTemplates>
-</file>
-
 <file path=customXml/itemProps1.xml><?xml version="1.0" encoding="utf-8"?>
-<ds:datastoreItem xmlns:ds="http://schemas.openxmlformats.org/officeDocument/2006/customXml" ds:itemID="{AE6CE79A-2381-456C-9A17-BED1112CF691}"/>
+<ds:datastoreItem xmlns:ds="http://schemas.openxmlformats.org/officeDocument/2006/customXml" ds:itemID="{A4A8419E-3C53-4B4C-AF8A-EEEFDB714CAE}">
+  <ds:schemaRefs>
+    <ds:schemaRef ds:uri="http://schemas.microsoft.com/sharepoint/v3/contenttype/forms"/>
+  </ds:schemaRefs>
+</ds:datastoreItem>
 </file>
 
 <file path=customXml/itemProps2.xml><?xml version="1.0" encoding="utf-8"?>
@@ -15356,9 +15360,19 @@
 </file>
 
 <file path=customXml/itemProps3.xml><?xml version="1.0" encoding="utf-8"?>
-<ds:datastoreItem xmlns:ds="http://schemas.openxmlformats.org/officeDocument/2006/customXml" ds:itemID="{A4A8419E-3C53-4B4C-AF8A-EEEFDB714CAE}">
+<ds:datastoreItem xmlns:ds="http://schemas.openxmlformats.org/officeDocument/2006/customXml" ds:itemID="{AE6CE79A-2381-456C-9A17-BED1112CF691}">
   <ds:schemaRefs>
-    <ds:schemaRef ds:uri="http://schemas.microsoft.com/sharepoint/v3/contenttype/forms"/>
+    <ds:schemaRef ds:uri="http://schemas.microsoft.com/office/2006/metadata/contentType"/>
+    <ds:schemaRef ds:uri="http://schemas.microsoft.com/office/2006/metadata/properties/metaAttributes"/>
+    <ds:schemaRef ds:uri="http://www.w3.org/2001/XMLSchema"/>
+    <ds:schemaRef ds:uri="http://schemas.microsoft.com/office/2006/metadata/properties"/>
+    <ds:schemaRef ds:uri="a3b97f0a-8a49-47eb-801c-707cd9a5bca1"/>
+    <ds:schemaRef ds:uri="http://schemas.microsoft.com/office/2006/documentManagement/types"/>
+    <ds:schemaRef ds:uri="http://schemas.microsoft.com/office/infopath/2007/PartnerControls"/>
+    <ds:schemaRef ds:uri="http://schemas.openxmlformats.org/package/2006/metadata/core-properties"/>
+    <ds:schemaRef ds:uri="http://purl.org/dc/elements/1.1/"/>
+    <ds:schemaRef ds:uri="http://purl.org/dc/terms/"/>
+    <ds:schemaRef ds:uri="http://schemas.microsoft.com/internal/obd"/>
   </ds:schemaRefs>
 </ds:datastoreItem>
 </file>
</xml_diff>